<commit_message>
resized image and published post
</commit_message>
<xml_diff>
--- a/static/post/2015/11/external-tasks/ExternalTask.pptx
+++ b/static/post/2015/11/external-tasks/ExternalTask.pptx
@@ -280,7 +280,7 @@
             <a:fld id="{80F06307-6088-4DFD-BB97-31C1E3C8F94D}" type="datetimeFigureOut">
               <a:rPr lang="en-US" smtClean="0"/>
               <a:pPr/>
-              <a:t>11/18/2015</a:t>
+              <a:t>11/26/2015</a:t>
             </a:fld>
             <a:endParaRPr lang="de-DE"/>
           </a:p>
@@ -451,7 +451,7 @@
             <a:fld id="{56E7BBA9-3E9F-478E-BBF6-AD90C451F165}" type="datetimeFigureOut">
               <a:rPr lang="en-GB" smtClean="0"/>
               <a:pPr/>
-              <a:t>18/11/2015</a:t>
+              <a:t>26/11/2015</a:t>
             </a:fld>
             <a:endParaRPr lang="en-GB"/>
           </a:p>
@@ -825,7 +825,7 @@
           <a:graphicData uri="http://schemas.openxmlformats.org/presentationml/2006/ole">
             <mc:AlternateContent xmlns:mc="http://schemas.openxmlformats.org/markup-compatibility/2006">
               <mc:Choice xmlns:v="urn:schemas-microsoft-com:vml" Requires="v">
-                <p:oleObj spid="_x0000_s1028" name="think-cell Slide" r:id="rId8" imgW="0" imgH="0" progId="TCLayout.ActiveDocument.1">
+                <p:oleObj spid="_x0000_s1030" name="think-cell Slide" r:id="rId8" imgW="0" imgH="0" progId="TCLayout.ActiveDocument.1">
                   <p:embed/>
                 </p:oleObj>
               </mc:Choice>
@@ -1090,7 +1090,7 @@
           <a:graphicData uri="http://schemas.openxmlformats.org/presentationml/2006/ole">
             <mc:AlternateContent xmlns:mc="http://schemas.openxmlformats.org/markup-compatibility/2006">
               <mc:Choice xmlns:v="urn:schemas-microsoft-com:vml" Requires="v">
-                <p:oleObj spid="_x0000_s8195" name="think-cell Slide" r:id="rId5" imgW="0" imgH="0" progId="TCLayout.ActiveDocument.1">
+                <p:oleObj spid="_x0000_s8197" name="think-cell Slide" r:id="rId5" imgW="0" imgH="0" progId="TCLayout.ActiveDocument.1">
                   <p:embed/>
                 </p:oleObj>
               </mc:Choice>
@@ -1400,7 +1400,7 @@
           <a:graphicData uri="http://schemas.openxmlformats.org/presentationml/2006/ole">
             <mc:AlternateContent xmlns:mc="http://schemas.openxmlformats.org/markup-compatibility/2006">
               <mc:Choice xmlns:v="urn:schemas-microsoft-com:vml" Requires="v">
-                <p:oleObj spid="_x0000_s136196" name="think-cell Slide" r:id="rId6" imgW="0" imgH="0" progId="TCLayout.ActiveDocument.1">
+                <p:oleObj spid="_x0000_s136198" name="think-cell Slide" r:id="rId6" imgW="0" imgH="0" progId="TCLayout.ActiveDocument.1">
                   <p:embed/>
                 </p:oleObj>
               </mc:Choice>
@@ -1747,7 +1747,7 @@
           <a:graphicData uri="http://schemas.openxmlformats.org/presentationml/2006/ole">
             <mc:AlternateContent xmlns:mc="http://schemas.openxmlformats.org/markup-compatibility/2006">
               <mc:Choice xmlns:v="urn:schemas-microsoft-com:vml" Requires="v">
-                <p:oleObj spid="_x0000_s108548" name="think-cell Slide" r:id="rId4" imgW="0" imgH="0" progId="TCLayout.ActiveDocument.1">
+                <p:oleObj spid="_x0000_s108550" name="think-cell Slide" r:id="rId4" imgW="0" imgH="0" progId="TCLayout.ActiveDocument.1">
                   <p:embed/>
                 </p:oleObj>
               </mc:Choice>
@@ -1950,7 +1950,7 @@
           <a:graphicData uri="http://schemas.openxmlformats.org/presentationml/2006/ole">
             <mc:AlternateContent xmlns:mc="http://schemas.openxmlformats.org/markup-compatibility/2006">
               <mc:Choice xmlns:v="urn:schemas-microsoft-com:vml" Requires="v">
-                <p:oleObj spid="_x0000_s114692" name="think-cell Slide" r:id="rId4" imgW="0" imgH="0" progId="TCLayout.ActiveDocument.1">
+                <p:oleObj spid="_x0000_s114694" name="think-cell Slide" r:id="rId4" imgW="0" imgH="0" progId="TCLayout.ActiveDocument.1">
                   <p:embed/>
                 </p:oleObj>
               </mc:Choice>
@@ -2153,7 +2153,7 @@
           <a:graphicData uri="http://schemas.openxmlformats.org/presentationml/2006/ole">
             <mc:AlternateContent xmlns:mc="http://schemas.openxmlformats.org/markup-compatibility/2006">
               <mc:Choice xmlns:v="urn:schemas-microsoft-com:vml" Requires="v">
-                <p:oleObj spid="_x0000_s107524" name="think-cell Slide" r:id="rId4" imgW="0" imgH="0" progId="TCLayout.ActiveDocument.1">
+                <p:oleObj spid="_x0000_s107526" name="think-cell Slide" r:id="rId4" imgW="0" imgH="0" progId="TCLayout.ActiveDocument.1">
                   <p:embed/>
                 </p:oleObj>
               </mc:Choice>
@@ -2274,7 +2274,7 @@
           <a:graphicData uri="http://schemas.openxmlformats.org/presentationml/2006/ole">
             <mc:AlternateContent xmlns:mc="http://schemas.openxmlformats.org/markup-compatibility/2006">
               <mc:Choice xmlns:v="urn:schemas-microsoft-com:vml" Requires="v">
-                <p:oleObj spid="_x0000_s115716" name="think-cell Slide" r:id="rId4" imgW="0" imgH="0" progId="TCLayout.ActiveDocument.1">
+                <p:oleObj spid="_x0000_s115718" name="think-cell Slide" r:id="rId4" imgW="0" imgH="0" progId="TCLayout.ActiveDocument.1">
                   <p:embed/>
                 </p:oleObj>
               </mc:Choice>
@@ -2485,7 +2485,7 @@
           <a:graphicData uri="http://schemas.openxmlformats.org/presentationml/2006/ole">
             <mc:AlternateContent xmlns:mc="http://schemas.openxmlformats.org/markup-compatibility/2006">
               <mc:Choice xmlns:v="urn:schemas-microsoft-com:vml" Requires="v">
-                <p:oleObj spid="_x0000_s137220" name="think-cell Slide" r:id="rId4" imgW="0" imgH="0" progId="TCLayout.ActiveDocument.1">
+                <p:oleObj spid="_x0000_s137222" name="think-cell Slide" r:id="rId4" imgW="0" imgH="0" progId="TCLayout.ActiveDocument.1">
                   <p:embed/>
                 </p:oleObj>
               </mc:Choice>
@@ -2645,7 +2645,7 @@
           <a:graphicData uri="http://schemas.openxmlformats.org/presentationml/2006/ole">
             <mc:AlternateContent xmlns:mc="http://schemas.openxmlformats.org/markup-compatibility/2006">
               <mc:Choice xmlns:v="urn:schemas-microsoft-com:vml" Requires="v">
-                <p:oleObj spid="_x0000_s116740" name="think-cell Slide" r:id="rId18" imgW="0" imgH="0" progId="TCLayout.ActiveDocument.1">
+                <p:oleObj spid="_x0000_s116742" name="think-cell Slide" r:id="rId18" imgW="0" imgH="0" progId="TCLayout.ActiveDocument.1">
                   <p:embed/>
                 </p:oleObj>
               </mc:Choice>
@@ -3814,7 +3814,7 @@
           <a:graphicData uri="http://schemas.openxmlformats.org/presentationml/2006/ole">
             <mc:AlternateContent xmlns:mc="http://schemas.openxmlformats.org/markup-compatibility/2006">
               <mc:Choice xmlns:v="urn:schemas-microsoft-com:vml" Requires="v">
-                <p:oleObj spid="_x0000_s2051" name="think-cell Slide" r:id="rId16" imgW="0" imgH="0" progId="TCLayout.ActiveDocument.1">
+                <p:oleObj spid="_x0000_s2053" name="think-cell Slide" r:id="rId16" imgW="0" imgH="0" progId="TCLayout.ActiveDocument.1">
                   <p:embed/>
                 </p:oleObj>
               </mc:Choice>
@@ -4353,6 +4353,69 @@
           <a:chExt cx="0" cy="0"/>
         </a:xfrm>
       </p:grpSpPr>
+      <p:sp>
+        <p:nvSpPr>
+          <p:cNvPr id="4" name="Rechteck 3"/>
+          <p:cNvSpPr/>
+          <p:nvPr/>
+        </p:nvSpPr>
+        <p:spPr bwMode="auto">
+          <a:xfrm>
+            <a:off x="443428" y="260648"/>
+            <a:ext cx="8257143" cy="4225495"/>
+          </a:xfrm>
+          <a:prstGeom prst="rect">
+            <a:avLst/>
+          </a:prstGeom>
+          <a:solidFill>
+            <a:schemeClr val="bg1"/>
+          </a:solidFill>
+          <a:ln w="9525" cap="flat" cmpd="sng" algn="ctr">
+            <a:noFill/>
+            <a:prstDash val="solid"/>
+            <a:round/>
+            <a:headEnd type="none" w="med" len="med"/>
+            <a:tailEnd type="none" w="med" len="med"/>
+          </a:ln>
+          <a:effectLst/>
+        </p:spPr>
+        <p:txBody>
+          <a:bodyPr vert="horz" wrap="square" lIns="72000" tIns="46800" rIns="72000" bIns="46800" numCol="1" rtlCol="0" anchor="ctr" anchorCtr="0" compatLnSpc="1">
+            <a:prstTxWarp prst="textNoShape">
+              <a:avLst/>
+            </a:prstTxWarp>
+          </a:bodyPr>
+          <a:lstStyle/>
+          <a:p>
+            <a:pPr marL="0" marR="0" indent="0" algn="l" defTabSz="914400" rtl="0" eaLnBrk="1" fontAlgn="base" latinLnBrk="0" hangingPunct="1">
+              <a:lnSpc>
+                <a:spcPct val="90000"/>
+              </a:lnSpc>
+              <a:spcBef>
+                <a:spcPct val="0"/>
+              </a:spcBef>
+              <a:spcAft>
+                <a:spcPct val="0"/>
+              </a:spcAft>
+              <a:buClrTx/>
+              <a:buSzTx/>
+              <a:buFontTx/>
+              <a:buNone/>
+              <a:tabLst/>
+            </a:pPr>
+            <a:endParaRPr kumimoji="0" lang="de-DE" sz="1400" b="0" i="0" u="none" strike="noStrike" cap="none" normalizeH="0" baseline="0" dirty="0" err="1" smtClean="0">
+              <a:ln>
+                <a:noFill/>
+              </a:ln>
+              <a:solidFill>
+                <a:schemeClr val="tx1"/>
+              </a:solidFill>
+              <a:effectLst/>
+              <a:latin typeface="+mn-lt"/>
+            </a:endParaRPr>
+          </a:p>
+        </p:txBody>
+      </p:sp>
       <p:pic>
         <p:nvPicPr>
           <p:cNvPr id="2" name="Grafik 1"/>

</xml_diff>